<commit_message>
Fixing TODOs for E/R Diagrams slides
</commit_message>
<xml_diff>
--- a/Courses/Software-Sciences/Module-3-Databases-New/07-Relationships-and-ER-Diagrams/07-Relationships-ER-Diagrams.pptx
+++ b/Courses/Software-Sciences/Module-3-Databases-New/07-Relationships-and-ER-Diagrams/07-Relationships-ER-Diagrams.pptx
@@ -5,10 +5,10 @@
     <p:sldMasterId id="2147483675" r:id="rId1"/>
   </p:sldMasterIdLst>
   <p:notesMasterIdLst>
-    <p:notesMasterId r:id="rId38"/>
+    <p:notesMasterId r:id="rId40"/>
   </p:notesMasterIdLst>
   <p:handoutMasterIdLst>
-    <p:handoutMasterId r:id="rId39"/>
+    <p:handoutMasterId r:id="rId41"/>
   </p:handoutMasterIdLst>
   <p:sldIdLst>
     <p:sldId id="503" r:id="rId2"/>
@@ -44,9 +44,11 @@
     <p:sldId id="534" r:id="rId32"/>
     <p:sldId id="533" r:id="rId33"/>
     <p:sldId id="544" r:id="rId34"/>
-    <p:sldId id="349" r:id="rId35"/>
-    <p:sldId id="504" r:id="rId36"/>
-    <p:sldId id="505" r:id="rId37"/>
+    <p:sldId id="546" r:id="rId35"/>
+    <p:sldId id="547" r:id="rId36"/>
+    <p:sldId id="349" r:id="rId37"/>
+    <p:sldId id="504" r:id="rId38"/>
+    <p:sldId id="505" r:id="rId39"/>
   </p:sldIdLst>
   <p:sldSz cx="12192000" cy="6858000"/>
   <p:notesSz cx="6858000" cy="9144000"/>
@@ -203,6 +205,8 @@
             <p14:sldId id="534"/>
             <p14:sldId id="533"/>
             <p14:sldId id="544"/>
+            <p14:sldId id="546"/>
+            <p14:sldId id="547"/>
           </p14:sldIdLst>
         </p14:section>
         <p14:section name="Обобщение" id="{126D8100-68B2-4688-A452-FEA3237D26FE}">
@@ -534,7 +538,7 @@
           <a:p>
             <a:fld id="{4E087215-0C8F-4762-A664-737A353EC9A4}" type="datetimeFigureOut">
               <a:rPr lang="bg-BG" smtClean="0"/>
-              <a:t>16.10.2023 г.</a:t>
+              <a:t>19.10.2023 г.</a:t>
             </a:fld>
             <a:endParaRPr lang="bg-BG"/>
           </a:p>
@@ -730,7 +734,7 @@
           <a:p>
             <a:fld id="{72D84649-876A-46C9-8472-14CB09C070D8}" type="datetimeFigureOut">
               <a:rPr lang="en-US" smtClean="0"/>
-              <a:t>16-Oct-23</a:t>
+              <a:t>10/19/2023</a:t>
             </a:fld>
             <a:endParaRPr lang="en-US"/>
           </a:p>
@@ -1749,7 +1753,7 @@
             <a:fld id="{3EBA5BD7-F043-4D1B-AA17-CD412FC534DE}" type="slidenum">
               <a:rPr lang="en-US" smtClean="0"/>
               <a:pPr/>
-              <a:t>34</a:t>
+              <a:t>36</a:t>
             </a:fld>
             <a:endParaRPr lang="en-US" dirty="0"/>
           </a:p>
@@ -1995,7 +1999,7 @@
             <a:fld id="{3EBA5BD7-F043-4D1B-AA17-CD412FC534DE}" type="slidenum">
               <a:rPr lang="en-US" smtClean="0"/>
               <a:pPr/>
-              <a:t>35</a:t>
+              <a:t>37</a:t>
             </a:fld>
             <a:endParaRPr lang="en-US" dirty="0"/>
           </a:p>
@@ -2241,7 +2245,7 @@
             <a:fld id="{3EBA5BD7-F043-4D1B-AA17-CD412FC534DE}" type="slidenum">
               <a:rPr lang="en-US" smtClean="0"/>
               <a:pPr/>
-              <a:t>36</a:t>
+              <a:t>38</a:t>
             </a:fld>
             <a:endParaRPr lang="en-US" dirty="0"/>
           </a:p>
@@ -10219,7 +10223,141 @@
           <a:bodyPr/>
           <a:lstStyle/>
           <a:p>
-            <a:endParaRPr lang="en-US"/>
+            <a:r>
+              <a:rPr lang="bg-BG" dirty="0"/>
+              <a:t>Задаваме ограничение на колоните</a:t>
+            </a:r>
+            <a:r>
+              <a:rPr lang="en-US" dirty="0"/>
+              <a:t> </a:t>
+            </a:r>
+            <a:r>
+              <a:rPr lang="en-US" b="1" dirty="0">
+                <a:solidFill>
+                  <a:schemeClr val="bg1"/>
+                </a:solidFill>
+                <a:latin typeface="Consolas" panose="020B0609020204030204" pitchFamily="49" charset="0"/>
+              </a:rPr>
+              <a:t>Name</a:t>
+            </a:r>
+            <a:r>
+              <a:rPr lang="en-US" dirty="0"/>
+              <a:t> </a:t>
+            </a:r>
+            <a:r>
+              <a:rPr lang="bg-BG" dirty="0"/>
+              <a:t>и </a:t>
+            </a:r>
+            <a:r>
+              <a:rPr lang="en-US" b="1" dirty="0">
+                <a:solidFill>
+                  <a:schemeClr val="bg1"/>
+                </a:solidFill>
+                <a:latin typeface="Consolas" panose="020B0609020204030204" pitchFamily="49" charset="0"/>
+              </a:rPr>
+              <a:t>Price</a:t>
+            </a:r>
+            <a:endParaRPr lang="bg-BG" b="1" dirty="0">
+              <a:solidFill>
+                <a:schemeClr val="bg1"/>
+              </a:solidFill>
+              <a:latin typeface="Consolas" panose="020B0609020204030204" pitchFamily="49" charset="0"/>
+            </a:endParaRPr>
+          </a:p>
+          <a:p>
+            <a:endParaRPr lang="bg-BG" b="1" dirty="0">
+              <a:solidFill>
+                <a:schemeClr val="bg1"/>
+              </a:solidFill>
+              <a:latin typeface="Consolas" panose="020B0609020204030204" pitchFamily="49" charset="0"/>
+            </a:endParaRPr>
+          </a:p>
+          <a:p>
+            <a:endParaRPr lang="bg-BG" b="1" dirty="0">
+              <a:solidFill>
+                <a:schemeClr val="bg1"/>
+              </a:solidFill>
+              <a:latin typeface="Consolas" panose="020B0609020204030204" pitchFamily="49" charset="0"/>
+            </a:endParaRPr>
+          </a:p>
+          <a:p>
+            <a:endParaRPr lang="bg-BG" b="1" dirty="0">
+              <a:solidFill>
+                <a:schemeClr val="bg1"/>
+              </a:solidFill>
+              <a:latin typeface="Consolas" panose="020B0609020204030204" pitchFamily="49" charset="0"/>
+            </a:endParaRPr>
+          </a:p>
+          <a:p>
+            <a:endParaRPr lang="bg-BG" dirty="0"/>
+          </a:p>
+          <a:p>
+            <a:r>
+              <a:rPr lang="bg-BG" dirty="0"/>
+              <a:t>Казваме, че ще имаме </a:t>
+            </a:r>
+            <a:r>
+              <a:rPr lang="bg-BG" b="1" dirty="0">
+                <a:solidFill>
+                  <a:schemeClr val="bg1"/>
+                </a:solidFill>
+              </a:rPr>
+              <a:t>неповтарящи</a:t>
+            </a:r>
+            <a:r>
+              <a:rPr lang="bg-BG" dirty="0"/>
+              <a:t> се </a:t>
+            </a:r>
+            <a:r>
+              <a:rPr lang="bg-BG" b="1" dirty="0">
+                <a:solidFill>
+                  <a:schemeClr val="bg1"/>
+                </a:solidFill>
+              </a:rPr>
+              <a:t>имена</a:t>
+            </a:r>
+            <a:r>
+              <a:rPr lang="bg-BG" dirty="0"/>
+              <a:t> и </a:t>
+            </a:r>
+            <a:r>
+              <a:rPr lang="bg-BG" b="1" dirty="0">
+                <a:solidFill>
+                  <a:schemeClr val="bg1"/>
+                </a:solidFill>
+              </a:rPr>
+              <a:t>цаната</a:t>
+            </a:r>
+            <a:r>
+              <a:rPr lang="bg-BG" dirty="0"/>
+              <a:t> на продуктите ще бъде </a:t>
+            </a:r>
+            <a:r>
+              <a:rPr lang="bg-BG" b="1" dirty="0">
+                <a:solidFill>
+                  <a:schemeClr val="bg1"/>
+                </a:solidFill>
+              </a:rPr>
+              <a:t>положително</a:t>
+            </a:r>
+            <a:r>
+              <a:rPr lang="bg-BG" dirty="0"/>
+              <a:t> </a:t>
+            </a:r>
+            <a:r>
+              <a:rPr lang="bg-BG" b="1" dirty="0">
+                <a:solidFill>
+                  <a:schemeClr val="bg1"/>
+                </a:solidFill>
+              </a:rPr>
+              <a:t>число</a:t>
+            </a:r>
+            <a:endParaRPr lang="bg-BG" b="1" dirty="0">
+              <a:solidFill>
+                <a:schemeClr val="bg1"/>
+              </a:solidFill>
+              <a:latin typeface="Consolas" panose="020B0609020204030204" pitchFamily="49" charset="0"/>
+            </a:endParaRPr>
           </a:p>
         </p:txBody>
       </p:sp>
@@ -10244,221 +10382,208 @@
           <a:bodyPr/>
           <a:lstStyle/>
           <a:p>
-            <a:endParaRPr lang="en-US" dirty="0"/>
+            <a:r>
+              <a:rPr lang="bg-BG" dirty="0"/>
+              <a:t>Ограничения на целостта </a:t>
+            </a:r>
+            <a:r>
+              <a:rPr lang="en-US" dirty="0"/>
+              <a:t>(3)</a:t>
+            </a:r>
           </a:p>
         </p:txBody>
       </p:sp>
       <p:sp>
         <p:nvSpPr>
-          <p:cNvPr id="5" name="Rectangle: Rounded Corners 4">
+          <p:cNvPr id="7" name="Rectangle 4">
             <a:extLst>
               <a:ext uri="{FF2B5EF4-FFF2-40B4-BE49-F238E27FC236}">
-                <a16:creationId xmlns:a16="http://schemas.microsoft.com/office/drawing/2014/main" id="{4D0EE611-F18B-FE0C-1809-6B09D18E5D5F}"/>
+                <a16:creationId xmlns:a16="http://schemas.microsoft.com/office/drawing/2014/main" id="{57530CCE-876A-F6AD-C198-2DC6C17E10BC}"/>
               </a:ext>
             </a:extLst>
           </p:cNvPr>
-          <p:cNvSpPr/>
+          <p:cNvSpPr>
+            <a:spLocks noChangeArrowheads="1"/>
+          </p:cNvSpPr>
           <p:nvPr/>
         </p:nvSpPr>
         <p:spPr bwMode="auto">
           <a:xfrm>
-            <a:off x="2001946" y="1255047"/>
-            <a:ext cx="9088108" cy="5145580"/>
+            <a:off x="2563500" y="2349000"/>
+            <a:ext cx="7312500" cy="1870448"/>
           </a:xfrm>
-          <a:prstGeom prst="roundRect">
+          <a:prstGeom prst="rect">
             <a:avLst/>
           </a:prstGeom>
-          <a:ln/>
+          <a:solidFill>
+            <a:schemeClr val="accent5">
+              <a:lumMod val="40000"/>
+              <a:lumOff val="60000"/>
+              <a:alpha val="15000"/>
+            </a:schemeClr>
+          </a:solidFill>
+          <a:ln w="12700">
+            <a:solidFill>
+              <a:schemeClr val="accent5">
+                <a:lumMod val="60000"/>
+                <a:lumOff val="40000"/>
+              </a:schemeClr>
+            </a:solidFill>
+          </a:ln>
         </p:spPr>
-        <p:style>
-          <a:lnRef idx="2">
-            <a:schemeClr val="accent2"/>
-          </a:lnRef>
-          <a:fillRef idx="1">
-            <a:schemeClr val="lt1"/>
-          </a:fillRef>
-          <a:effectRef idx="0">
-            <a:schemeClr val="accent2"/>
-          </a:effectRef>
-          <a:fontRef idx="minor">
-            <a:schemeClr val="dk1"/>
-          </a:fontRef>
-        </p:style>
         <p:txBody>
-          <a:bodyPr rot="0" spcFirstLastPara="0" vertOverflow="overflow" horzOverflow="overflow" vert="horz" wrap="square" lIns="91440" tIns="45720" rIns="91440" bIns="45720" numCol="1" spcCol="0" rtlCol="0" fromWordArt="0" anchor="ctr" anchorCtr="0" forceAA="0" compatLnSpc="1">
-            <a:prstTxWarp prst="textNoShape">
-              <a:avLst/>
-            </a:prstTxWarp>
-            <a:noAutofit/>
+          <a:bodyPr wrap="square">
+            <a:spAutoFit/>
           </a:bodyPr>
           <a:lstStyle/>
           <a:p>
-            <a:pPr algn="ctr"/>
-            <a:r>
-              <a:rPr lang="en-US" sz="4000" b="1" dirty="0">
+            <a:pPr eaLnBrk="0" hangingPunct="0">
+              <a:lnSpc>
+                <a:spcPts val="2800"/>
+              </a:lnSpc>
+              <a:buClr>
+                <a:schemeClr val="accent5">
+                  <a:lumMod val="40000"/>
+                  <a:lumOff val="60000"/>
+                </a:schemeClr>
+              </a:buClr>
+              <a:buSzPct val="70000"/>
+            </a:pPr>
+            <a:r>
+              <a:rPr lang="en-US" sz="2200" b="1" noProof="1">
                 <a:solidFill>
-                  <a:srgbClr val="FFFFFF"/>
+                  <a:schemeClr val="tx2"/>
                 </a:solidFill>
-                <a:effectLst>
-                  <a:outerShdw blurRad="38100" dist="38100" dir="2700000" algn="tl">
-                    <a:srgbClr val="000000">
-                      <a:alpha val="43137"/>
-                    </a:srgbClr>
-                  </a:outerShdw>
-                </a:effectLst>
+                <a:latin typeface="Consolas" pitchFamily="49" charset="0"/>
+                <a:cs typeface="Consolas" pitchFamily="49" charset="0"/>
               </a:rPr>
-              <a:t>TODO: </a:t>
-            </a:r>
-            <a:r>
-              <a:rPr lang="bg-BG" sz="4000" b="1" dirty="0">
-                <a:solidFill>
-                  <a:srgbClr val="FFFFFF"/>
-                </a:solidFill>
-                <a:effectLst>
-                  <a:outerShdw blurRad="38100" dist="38100" dir="2700000" algn="tl">
-                    <a:srgbClr val="000000">
-                      <a:alpha val="43137"/>
-                    </a:srgbClr>
-                  </a:outerShdw>
-                </a:effectLst>
-              </a:rPr>
-              <a:t>примери</a:t>
-            </a:r>
-            <a:br>
-              <a:rPr lang="bg-BG" sz="4000" b="1" dirty="0">
-                <a:solidFill>
-                  <a:srgbClr val="FFFFFF"/>
-                </a:solidFill>
-                <a:effectLst>
-                  <a:outerShdw blurRad="38100" dist="38100" dir="2700000" algn="tl">
-                    <a:srgbClr val="000000">
-                      <a:alpha val="43137"/>
-                    </a:srgbClr>
-                  </a:outerShdw>
-                </a:effectLst>
-              </a:rPr>
-            </a:br>
-            <a:br>
-              <a:rPr lang="bg-BG" sz="4000" b="1" dirty="0">
-                <a:solidFill>
-                  <a:srgbClr val="FFFFFF"/>
-                </a:solidFill>
-                <a:effectLst>
-                  <a:outerShdw blurRad="38100" dist="38100" dir="2700000" algn="tl">
-                    <a:srgbClr val="000000">
-                      <a:alpha val="43137"/>
-                    </a:srgbClr>
-                  </a:outerShdw>
-                </a:effectLst>
-              </a:rPr>
-            </a:br>
-            <a:r>
-              <a:rPr lang="bg-BG" sz="4000" b="1" dirty="0">
-                <a:solidFill>
-                  <a:srgbClr val="FFFFFF"/>
-                </a:solidFill>
-                <a:effectLst>
-                  <a:outerShdw blurRad="38100" dist="38100" dir="2700000" algn="tl">
-                    <a:srgbClr val="000000">
-                      <a:alpha val="43137"/>
-                    </a:srgbClr>
-                  </a:outerShdw>
-                </a:effectLst>
-              </a:rPr>
-              <a:t>Някакъв код, с който се създават тези </a:t>
-            </a:r>
-            <a:r>
-              <a:rPr lang="en-US" sz="4000" b="1" dirty="0">
-                <a:solidFill>
-                  <a:srgbClr val="FFFFFF"/>
-                </a:solidFill>
-                <a:effectLst>
-                  <a:outerShdw blurRad="38100" dist="38100" dir="2700000" algn="tl">
-                    <a:srgbClr val="000000">
-                      <a:alpha val="43137"/>
-                    </a:srgbClr>
-                  </a:outerShdw>
-                </a:effectLst>
-              </a:rPr>
-              <a:t>constraints</a:t>
+              <a:t>CREATE TABLE Products ( </a:t>
             </a:r>
           </a:p>
           <a:p>
-            <a:pPr algn="ctr"/>
-            <a:endParaRPr lang="en-US" sz="4000" b="1" dirty="0">
-              <a:solidFill>
-                <a:srgbClr val="FFFFFF"/>
-              </a:solidFill>
-              <a:effectLst>
-                <a:outerShdw blurRad="38100" dist="38100" dir="2700000" algn="tl">
-                  <a:srgbClr val="000000">
-                    <a:alpha val="43137"/>
-                  </a:srgbClr>
-                </a:outerShdw>
-              </a:effectLst>
-            </a:endParaRPr>
+            <a:pPr eaLnBrk="0" hangingPunct="0">
+              <a:lnSpc>
+                <a:spcPts val="2800"/>
+              </a:lnSpc>
+              <a:buClr>
+                <a:schemeClr val="accent5">
+                  <a:lumMod val="40000"/>
+                  <a:lumOff val="60000"/>
+                </a:schemeClr>
+              </a:buClr>
+              <a:buSzPct val="70000"/>
+            </a:pPr>
+            <a:r>
+              <a:rPr lang="en-US" sz="2200" b="1" noProof="1">
+                <a:solidFill>
+                  <a:schemeClr val="tx2"/>
+                </a:solidFill>
+                <a:latin typeface="Consolas" pitchFamily="49" charset="0"/>
+                <a:cs typeface="Consolas" pitchFamily="49" charset="0"/>
+              </a:rPr>
+              <a:t>	Id INT PRIMARY KEY,</a:t>
+            </a:r>
           </a:p>
           <a:p>
-            <a:pPr algn="ctr"/>
-            <a:r>
-              <a:rPr lang="bg-BG" sz="4000" b="1" dirty="0">
+            <a:pPr eaLnBrk="0" hangingPunct="0">
+              <a:lnSpc>
+                <a:spcPts val="2800"/>
+              </a:lnSpc>
+              <a:buClr>
+                <a:schemeClr val="accent5">
+                  <a:lumMod val="40000"/>
+                  <a:lumOff val="60000"/>
+                </a:schemeClr>
+              </a:buClr>
+              <a:buSzPct val="70000"/>
+            </a:pPr>
+            <a:r>
+              <a:rPr lang="en-US" sz="2200" b="1" noProof="1">
                 <a:solidFill>
-                  <a:srgbClr val="FFFFFF"/>
+                  <a:schemeClr val="tx2"/>
                 </a:solidFill>
-                <a:effectLst>
-                  <a:outerShdw blurRad="38100" dist="38100" dir="2700000" algn="tl">
-                    <a:srgbClr val="000000">
-                      <a:alpha val="43137"/>
-                    </a:srgbClr>
-                  </a:outerShdw>
-                </a:effectLst>
+                <a:latin typeface="Consolas" pitchFamily="49" charset="0"/>
+                <a:cs typeface="Consolas" pitchFamily="49" charset="0"/>
               </a:rPr>
-              <a:t>Може и </a:t>
-            </a:r>
-            <a:r>
-              <a:rPr lang="en-US" sz="4000" b="1" dirty="0">
+              <a:t>	[Name] VARCHAR(255) </a:t>
+            </a:r>
+            <a:r>
+              <a:rPr lang="en-US" sz="2200" b="1" noProof="1">
                 <a:solidFill>
-                  <a:srgbClr val="FFFFFF"/>
+                  <a:schemeClr val="bg1"/>
                 </a:solidFill>
-                <a:effectLst>
-                  <a:outerShdw blurRad="38100" dist="38100" dir="2700000" algn="tl">
-                    <a:srgbClr val="000000">
-                      <a:alpha val="43137"/>
-                    </a:srgbClr>
-                  </a:outerShdw>
-                </a:effectLst>
+                <a:latin typeface="Consolas" pitchFamily="49" charset="0"/>
+                <a:cs typeface="Consolas" pitchFamily="49" charset="0"/>
               </a:rPr>
-              <a:t>screenshot </a:t>
-            </a:r>
-            <a:r>
-              <a:rPr lang="bg-BG" sz="4000" b="1" dirty="0">
+              <a:t>UNIQUE</a:t>
+            </a:r>
+            <a:r>
+              <a:rPr lang="en-US" sz="2200" b="1" noProof="1">
                 <a:solidFill>
-                  <a:srgbClr val="FFFFFF"/>
+                  <a:schemeClr val="tx2"/>
                 </a:solidFill>
-                <a:effectLst>
-                  <a:outerShdw blurRad="38100" dist="38100" dir="2700000" algn="tl">
-                    <a:srgbClr val="000000">
-                      <a:alpha val="43137"/>
-                    </a:srgbClr>
-                  </a:outerShdw>
-                </a:effectLst>
+                <a:latin typeface="Consolas" pitchFamily="49" charset="0"/>
+                <a:cs typeface="Consolas" pitchFamily="49" charset="0"/>
               </a:rPr>
-              <a:t>от </a:t>
-            </a:r>
-            <a:r>
-              <a:rPr lang="en-US" sz="4000" b="1" dirty="0">
+              <a:t>,</a:t>
+            </a:r>
+          </a:p>
+          <a:p>
+            <a:pPr eaLnBrk="0" hangingPunct="0">
+              <a:lnSpc>
+                <a:spcPts val="2800"/>
+              </a:lnSpc>
+              <a:buClr>
+                <a:schemeClr val="accent5">
+                  <a:lumMod val="40000"/>
+                  <a:lumOff val="60000"/>
+                </a:schemeClr>
+              </a:buClr>
+              <a:buSzPct val="70000"/>
+            </a:pPr>
+            <a:r>
+              <a:rPr lang="en-US" sz="2200" b="1" noProof="1">
                 <a:solidFill>
-                  <a:srgbClr val="FFFFFF"/>
+                  <a:schemeClr val="tx2"/>
                 </a:solidFill>
-                <a:effectLst>
-                  <a:outerShdw blurRad="38100" dist="38100" dir="2700000" algn="tl">
-                    <a:srgbClr val="000000">
-                      <a:alpha val="43137"/>
-                    </a:srgbClr>
-                  </a:outerShdw>
-                </a:effectLst>
+                <a:latin typeface="Consolas" pitchFamily="49" charset="0"/>
+                <a:cs typeface="Consolas" pitchFamily="49" charset="0"/>
               </a:rPr>
-              <a:t>SQL Server Management Studio.</a:t>
+              <a:t>	Price DECIMAL(10, 2) </a:t>
+            </a:r>
+            <a:r>
+              <a:rPr lang="en-US" sz="2200" b="1" noProof="1">
+                <a:solidFill>
+                  <a:schemeClr val="bg1"/>
+                </a:solidFill>
+                <a:latin typeface="Consolas" pitchFamily="49" charset="0"/>
+                <a:cs typeface="Consolas" pitchFamily="49" charset="0"/>
+              </a:rPr>
+              <a:t>CHECK (Price &gt; 0) </a:t>
+            </a:r>
+          </a:p>
+          <a:p>
+            <a:pPr eaLnBrk="0" hangingPunct="0">
+              <a:lnSpc>
+                <a:spcPts val="2800"/>
+              </a:lnSpc>
+              <a:buClr>
+                <a:schemeClr val="accent5">
+                  <a:lumMod val="40000"/>
+                  <a:lumOff val="60000"/>
+                </a:schemeClr>
+              </a:buClr>
+              <a:buSzPct val="70000"/>
+            </a:pPr>
+            <a:r>
+              <a:rPr lang="en-US" sz="2200" b="1" noProof="1">
+                <a:solidFill>
+                  <a:schemeClr val="tx2"/>
+                </a:solidFill>
+                <a:latin typeface="Consolas" pitchFamily="49" charset="0"/>
+                <a:cs typeface="Consolas" pitchFamily="49" charset="0"/>
+              </a:rPr>
+              <a:t>)</a:t>
             </a:r>
           </a:p>
         </p:txBody>
@@ -10481,6 +10606,136 @@
       <p:transition spd="slow" advClick="0" advTm="5000"/>
     </mc:Fallback>
   </mc:AlternateContent>
+  <p:timing>
+    <p:tnLst>
+      <p:par>
+        <p:cTn id="1" dur="indefinite" restart="never" nodeType="tmRoot">
+          <p:childTnLst>
+            <p:seq concurrent="1" nextAc="seek">
+              <p:cTn id="2" dur="indefinite" nodeType="mainSeq">
+                <p:childTnLst>
+                  <p:par>
+                    <p:cTn id="3" fill="hold">
+                      <p:stCondLst>
+                        <p:cond delay="indefinite"/>
+                        <p:cond evt="onBegin" delay="0">
+                          <p:tn val="2"/>
+                        </p:cond>
+                      </p:stCondLst>
+                      <p:childTnLst>
+                        <p:par>
+                          <p:cTn id="4" fill="hold">
+                            <p:stCondLst>
+                              <p:cond delay="0"/>
+                            </p:stCondLst>
+                            <p:childTnLst>
+                              <p:par>
+                                <p:cTn id="5" presetID="1" presetClass="entr" presetSubtype="0" fill="hold" grpId="0" nodeType="withEffect">
+                                  <p:stCondLst>
+                                    <p:cond delay="0"/>
+                                  </p:stCondLst>
+                                  <p:childTnLst>
+                                    <p:set>
+                                      <p:cBhvr>
+                                        <p:cTn id="6" dur="1" fill="hold">
+                                          <p:stCondLst>
+                                            <p:cond delay="0"/>
+                                          </p:stCondLst>
+                                        </p:cTn>
+                                        <p:tgtEl>
+                                          <p:spTgt spid="7"/>
+                                        </p:tgtEl>
+                                        <p:attrNameLst>
+                                          <p:attrName>style.visibility</p:attrName>
+                                        </p:attrNameLst>
+                                      </p:cBhvr>
+                                      <p:to>
+                                        <p:strVal val="visible"/>
+                                      </p:to>
+                                    </p:set>
+                                  </p:childTnLst>
+                                </p:cTn>
+                              </p:par>
+                            </p:childTnLst>
+                          </p:cTn>
+                        </p:par>
+                      </p:childTnLst>
+                    </p:cTn>
+                  </p:par>
+                  <p:par>
+                    <p:cTn id="7" fill="hold">
+                      <p:stCondLst>
+                        <p:cond delay="indefinite"/>
+                      </p:stCondLst>
+                      <p:childTnLst>
+                        <p:par>
+                          <p:cTn id="8" fill="hold">
+                            <p:stCondLst>
+                              <p:cond delay="0"/>
+                            </p:stCondLst>
+                            <p:childTnLst>
+                              <p:par>
+                                <p:cTn id="9" presetID="1" presetClass="entr" presetSubtype="0" fill="hold" nodeType="clickEffect">
+                                  <p:stCondLst>
+                                    <p:cond delay="0"/>
+                                  </p:stCondLst>
+                                  <p:childTnLst>
+                                    <p:set>
+                                      <p:cBhvr>
+                                        <p:cTn id="10" dur="1" fill="hold">
+                                          <p:stCondLst>
+                                            <p:cond delay="0"/>
+                                          </p:stCondLst>
+                                        </p:cTn>
+                                        <p:tgtEl>
+                                          <p:spTgt spid="3">
+                                            <p:txEl>
+                                              <p:pRg st="5" end="5"/>
+                                            </p:txEl>
+                                          </p:spTgt>
+                                        </p:tgtEl>
+                                        <p:attrNameLst>
+                                          <p:attrName>style.visibility</p:attrName>
+                                        </p:attrNameLst>
+                                      </p:cBhvr>
+                                      <p:to>
+                                        <p:strVal val="visible"/>
+                                      </p:to>
+                                    </p:set>
+                                  </p:childTnLst>
+                                </p:cTn>
+                              </p:par>
+                            </p:childTnLst>
+                          </p:cTn>
+                        </p:par>
+                      </p:childTnLst>
+                    </p:cTn>
+                  </p:par>
+                </p:childTnLst>
+              </p:cTn>
+              <p:prevCondLst>
+                <p:cond evt="onPrev" delay="0">
+                  <p:tgtEl>
+                    <p:sldTgt/>
+                  </p:tgtEl>
+                </p:cond>
+              </p:prevCondLst>
+              <p:nextCondLst>
+                <p:cond evt="onNext" delay="0">
+                  <p:tgtEl>
+                    <p:sldTgt/>
+                  </p:tgtEl>
+                </p:cond>
+              </p:nextCondLst>
+            </p:seq>
+          </p:childTnLst>
+        </p:cTn>
+      </p:par>
+    </p:tnLst>
+    <p:bldLst>
+      <p:bldP spid="7" grpId="0" animBg="1"/>
+    </p:bldLst>
+  </p:timing>
 </p:sld>
 </file>
 
@@ -29432,7 +29687,64 @@
           <a:bodyPr/>
           <a:lstStyle/>
           <a:p>
-            <a:endParaRPr lang="en-US"/>
+            <a:r>
+              <a:rPr lang="ru-RU" dirty="0"/>
+              <a:t>В </a:t>
+            </a:r>
+            <a:r>
+              <a:rPr lang="ru-RU" b="1" dirty="0">
+                <a:solidFill>
+                  <a:schemeClr val="bg1"/>
+                </a:solidFill>
+                <a:latin typeface="Consolas" panose="020B0609020204030204" pitchFamily="49" charset="0"/>
+              </a:rPr>
+              <a:t>Object Explorer</a:t>
+            </a:r>
+            <a:r>
+              <a:rPr lang="ru-RU" dirty="0"/>
+              <a:t> отляв разгънете вашата база данни</a:t>
+            </a:r>
+            <a:endParaRPr lang="en-US" dirty="0"/>
+          </a:p>
+          <a:p>
+            <a:r>
+              <a:rPr lang="ru-RU" dirty="0"/>
+              <a:t>Щракнете с </a:t>
+            </a:r>
+            <a:r>
+              <a:rPr lang="ru-RU" b="1" dirty="0">
+                <a:solidFill>
+                  <a:schemeClr val="bg1"/>
+                </a:solidFill>
+              </a:rPr>
+              <a:t>десния бутон </a:t>
+            </a:r>
+            <a:r>
+              <a:rPr lang="ru-RU" dirty="0"/>
+              <a:t>върху </a:t>
+            </a:r>
+            <a:r>
+              <a:rPr lang="en-US" b="1" dirty="0">
+                <a:solidFill>
+                  <a:schemeClr val="bg1"/>
+                </a:solidFill>
+                <a:latin typeface="Consolas" panose="020B0609020204030204" pitchFamily="49" charset="0"/>
+              </a:rPr>
+              <a:t>Database Diagrams</a:t>
+            </a:r>
+            <a:r>
+              <a:rPr lang="ru-RU" dirty="0"/>
+              <a:t> и след това изберете </a:t>
+            </a:r>
+            <a:r>
+              <a:rPr lang="en-US" b="1" dirty="0">
+                <a:solidFill>
+                  <a:schemeClr val="bg1"/>
+                </a:solidFill>
+                <a:latin typeface="Consolas" panose="020B0609020204030204" pitchFamily="49" charset="0"/>
+              </a:rPr>
+              <a:t>New Database Diagram</a:t>
+            </a:r>
           </a:p>
         </p:txBody>
       </p:sp>
@@ -29457,197 +29769,76 @@
           <a:bodyPr/>
           <a:lstStyle/>
           <a:p>
-            <a:endParaRPr lang="en-US"/>
+            <a:r>
+              <a:rPr lang="bg-BG" dirty="0"/>
+              <a:t>Как да създадем </a:t>
+            </a:r>
+            <a:r>
+              <a:rPr lang="en-US" dirty="0"/>
+              <a:t>E/R </a:t>
+            </a:r>
+            <a:r>
+              <a:rPr lang="bg-BG" dirty="0"/>
+              <a:t>диаграма? (1)</a:t>
+            </a:r>
+            <a:endParaRPr lang="en-US" dirty="0"/>
           </a:p>
         </p:txBody>
       </p:sp>
-      <p:sp>
-        <p:nvSpPr>
-          <p:cNvPr id="5" name="Rectangle: Rounded Corners 4">
+      <p:pic>
+        <p:nvPicPr>
+          <p:cNvPr id="1026" name="Picture 2" descr="New Database diagram">
             <a:extLst>
               <a:ext uri="{FF2B5EF4-FFF2-40B4-BE49-F238E27FC236}">
-                <a16:creationId xmlns:a16="http://schemas.microsoft.com/office/drawing/2014/main" id="{46E80155-3501-0729-9B73-D9AB01E62B2D}"/>
+                <a16:creationId xmlns:a16="http://schemas.microsoft.com/office/drawing/2014/main" id="{92A35C27-82C6-DE56-6904-BCC061346E4A}"/>
               </a:ext>
             </a:extLst>
           </p:cNvPr>
-          <p:cNvSpPr/>
+          <p:cNvPicPr>
+            <a:picLocks noChangeAspect="1" noChangeArrowheads="1"/>
+          </p:cNvPicPr>
           <p:nvPr/>
-        </p:nvSpPr>
+        </p:nvPicPr>
+        <p:blipFill>
+          <a:blip r:embed="rId2">
+            <a:extLst>
+              <a:ext uri="{28A0092B-C50C-407E-A947-70E740481C1C}">
+                <a14:useLocalDpi xmlns:a14="http://schemas.microsoft.com/office/drawing/2010/main" val="0"/>
+              </a:ext>
+            </a:extLst>
+          </a:blip>
+          <a:srcRect/>
+          <a:stretch>
+            <a:fillRect/>
+          </a:stretch>
+        </p:blipFill>
         <p:spPr bwMode="auto">
           <a:xfrm>
-            <a:off x="2001946" y="1255047"/>
-            <a:ext cx="9088108" cy="5145580"/>
+            <a:off x="4085144" y="3294000"/>
+            <a:ext cx="4021713" cy="3152700"/>
           </a:xfrm>
-          <a:prstGeom prst="roundRect">
+          <a:prstGeom prst="rect">
             <a:avLst/>
           </a:prstGeom>
-          <a:ln/>
-        </p:spPr>
-        <p:style>
-          <a:lnRef idx="2">
-            <a:schemeClr val="accent2"/>
-          </a:lnRef>
-          <a:fillRef idx="1">
-            <a:schemeClr val="lt1"/>
-          </a:fillRef>
-          <a:effectRef idx="0">
-            <a:schemeClr val="accent2"/>
-          </a:effectRef>
-          <a:fontRef idx="minor">
-            <a:schemeClr val="dk1"/>
-          </a:fontRef>
-        </p:style>
-        <p:txBody>
-          <a:bodyPr rot="0" spcFirstLastPara="0" vertOverflow="overflow" horzOverflow="overflow" vert="horz" wrap="square" lIns="91440" tIns="45720" rIns="91440" bIns="45720" numCol="1" spcCol="0" rtlCol="0" fromWordArt="0" anchor="ctr" anchorCtr="0" forceAA="0" compatLnSpc="1">
-            <a:prstTxWarp prst="textNoShape">
-              <a:avLst/>
-            </a:prstTxWarp>
-            <a:noAutofit/>
-          </a:bodyPr>
-          <a:lstStyle/>
-          <a:p>
-            <a:pPr algn="ctr"/>
-            <a:r>
-              <a:rPr lang="en-US" sz="4000" b="1" dirty="0">
+          <a:noFill/>
+          <a:ln>
+            <a:solidFill>
+              <a:schemeClr val="bg2">
+                <a:lumMod val="75000"/>
+              </a:schemeClr>
+            </a:solidFill>
+          </a:ln>
+          <a:extLst>
+            <a:ext uri="{909E8E84-426E-40DD-AFC4-6F175D3DCCD1}">
+              <a14:hiddenFill xmlns:a14="http://schemas.microsoft.com/office/drawing/2010/main">
                 <a:solidFill>
                   <a:srgbClr val="FFFFFF"/>
                 </a:solidFill>
-                <a:effectLst>
-                  <a:outerShdw blurRad="38100" dist="38100" dir="2700000" algn="tl">
-                    <a:srgbClr val="000000">
-                      <a:alpha val="43137"/>
-                    </a:srgbClr>
-                  </a:outerShdw>
-                </a:effectLst>
-              </a:rPr>
-              <a:t>TODO: </a:t>
-            </a:r>
-            <a:r>
-              <a:rPr lang="bg-BG" sz="4000" b="1" dirty="0">
-                <a:solidFill>
-                  <a:srgbClr val="FFFFFF"/>
-                </a:solidFill>
-                <a:effectLst>
-                  <a:outerShdw blurRad="38100" dist="38100" dir="2700000" algn="tl">
-                    <a:srgbClr val="000000">
-                      <a:alpha val="43137"/>
-                    </a:srgbClr>
-                  </a:outerShdw>
-                </a:effectLst>
-              </a:rPr>
-              <a:t>да се даде пример с няколко </a:t>
-            </a:r>
-            <a:r>
-              <a:rPr lang="en-US" sz="4000" b="1" dirty="0">
-                <a:solidFill>
-                  <a:srgbClr val="FFFFFF"/>
-                </a:solidFill>
-                <a:effectLst>
-                  <a:outerShdw blurRad="38100" dist="38100" dir="2700000" algn="tl">
-                    <a:srgbClr val="000000">
-                      <a:alpha val="43137"/>
-                    </a:srgbClr>
-                  </a:outerShdw>
-                </a:effectLst>
-              </a:rPr>
-              <a:t>screenshots </a:t>
-            </a:r>
-            <a:r>
-              <a:rPr lang="bg-BG" sz="4000" b="1" dirty="0">
-                <a:solidFill>
-                  <a:srgbClr val="FFFFFF"/>
-                </a:solidFill>
-                <a:effectLst>
-                  <a:outerShdw blurRad="38100" dist="38100" dir="2700000" algn="tl">
-                    <a:srgbClr val="000000">
-                      <a:alpha val="43137"/>
-                    </a:srgbClr>
-                  </a:outerShdw>
-                </a:effectLst>
-              </a:rPr>
-              <a:t>как се генерира </a:t>
-            </a:r>
-            <a:r>
-              <a:rPr lang="en-US" sz="4000" b="1" dirty="0">
-                <a:solidFill>
-                  <a:srgbClr val="FFFFFF"/>
-                </a:solidFill>
-                <a:effectLst>
-                  <a:outerShdw blurRad="38100" dist="38100" dir="2700000" algn="tl">
-                    <a:srgbClr val="000000">
-                      <a:alpha val="43137"/>
-                    </a:srgbClr>
-                  </a:outerShdw>
-                </a:effectLst>
-              </a:rPr>
-              <a:t>E/R</a:t>
-            </a:r>
-            <a:r>
-              <a:rPr lang="bg-BG" sz="4000" b="1" dirty="0">
-                <a:solidFill>
-                  <a:srgbClr val="FFFFFF"/>
-                </a:solidFill>
-                <a:effectLst>
-                  <a:outerShdw blurRad="38100" dist="38100" dir="2700000" algn="tl">
-                    <a:srgbClr val="000000">
-                      <a:alpha val="43137"/>
-                    </a:srgbClr>
-                  </a:outerShdw>
-                </a:effectLst>
-              </a:rPr>
-              <a:t> диаграма в </a:t>
-            </a:r>
-            <a:r>
-              <a:rPr lang="en-US" sz="4000" b="1" dirty="0">
-                <a:solidFill>
-                  <a:srgbClr val="FFFFFF"/>
-                </a:solidFill>
-                <a:effectLst>
-                  <a:outerShdw blurRad="38100" dist="38100" dir="2700000" algn="tl">
-                    <a:srgbClr val="000000">
-                      <a:alpha val="43137"/>
-                    </a:srgbClr>
-                  </a:outerShdw>
-                </a:effectLst>
-              </a:rPr>
-              <a:t>SSMS</a:t>
-            </a:r>
-          </a:p>
-          <a:p>
-            <a:pPr algn="ctr"/>
-            <a:endParaRPr lang="en-US" sz="4000" b="1" dirty="0">
-              <a:solidFill>
-                <a:srgbClr val="FFFFFF"/>
-              </a:solidFill>
-              <a:effectLst>
-                <a:outerShdw blurRad="38100" dist="38100" dir="2700000" algn="tl">
-                  <a:srgbClr val="000000">
-                    <a:alpha val="43137"/>
-                  </a:srgbClr>
-                </a:outerShdw>
-              </a:effectLst>
-            </a:endParaRPr>
-          </a:p>
-          <a:p>
-            <a:pPr algn="ctr"/>
-            <a:r>
-              <a:rPr lang="en-US" sz="4000" b="1" dirty="0">
-                <a:solidFill>
-                  <a:srgbClr val="FFFFFF"/>
-                </a:solidFill>
-                <a:effectLst>
-                  <a:outerShdw blurRad="38100" dist="38100" dir="2700000" algn="tl">
-                    <a:srgbClr val="000000">
-                      <a:alpha val="43137"/>
-                    </a:srgbClr>
-                  </a:outerShdw>
-                </a:effectLst>
-              </a:rPr>
-              <a:t>https://hasura.io/learn/database/microsoft-sql-server/er-modeling </a:t>
-            </a:r>
-          </a:p>
-        </p:txBody>
-      </p:sp>
+              </a14:hiddenFill>
+            </a:ext>
+          </a:extLst>
+        </p:spPr>
+      </p:pic>
     </p:spTree>
     <p:extLst>
       <p:ext uri="{BB962C8B-B14F-4D97-AF65-F5344CB8AC3E}">
@@ -29666,10 +29857,547 @@
       <p:transition spd="slow" advClick="0" advTm="5000"/>
     </mc:Fallback>
   </mc:AlternateContent>
+  <p:timing>
+    <p:tnLst>
+      <p:par>
+        <p:cTn id="1" dur="indefinite" restart="never" nodeType="tmRoot">
+          <p:childTnLst>
+            <p:seq concurrent="1" nextAc="seek">
+              <p:cTn id="2" dur="indefinite" nodeType="mainSeq">
+                <p:childTnLst>
+                  <p:par>
+                    <p:cTn id="3" fill="hold">
+                      <p:stCondLst>
+                        <p:cond delay="indefinite"/>
+                      </p:stCondLst>
+                      <p:childTnLst>
+                        <p:par>
+                          <p:cTn id="4" fill="hold">
+                            <p:stCondLst>
+                              <p:cond delay="0"/>
+                            </p:stCondLst>
+                            <p:childTnLst>
+                              <p:par>
+                                <p:cTn id="5" presetID="1" presetClass="entr" presetSubtype="0" fill="hold" nodeType="clickEffect">
+                                  <p:stCondLst>
+                                    <p:cond delay="0"/>
+                                  </p:stCondLst>
+                                  <p:childTnLst>
+                                    <p:set>
+                                      <p:cBhvr>
+                                        <p:cTn id="6" dur="1" fill="hold">
+                                          <p:stCondLst>
+                                            <p:cond delay="0"/>
+                                          </p:stCondLst>
+                                        </p:cTn>
+                                        <p:tgtEl>
+                                          <p:spTgt spid="3">
+                                            <p:txEl>
+                                              <p:pRg st="1" end="1"/>
+                                            </p:txEl>
+                                          </p:spTgt>
+                                        </p:tgtEl>
+                                        <p:attrNameLst>
+                                          <p:attrName>style.visibility</p:attrName>
+                                        </p:attrNameLst>
+                                      </p:cBhvr>
+                                      <p:to>
+                                        <p:strVal val="visible"/>
+                                      </p:to>
+                                    </p:set>
+                                  </p:childTnLst>
+                                </p:cTn>
+                              </p:par>
+                              <p:par>
+                                <p:cTn id="7" presetID="1" presetClass="entr" presetSubtype="0" fill="hold" nodeType="withEffect">
+                                  <p:stCondLst>
+                                    <p:cond delay="0"/>
+                                  </p:stCondLst>
+                                  <p:childTnLst>
+                                    <p:set>
+                                      <p:cBhvr>
+                                        <p:cTn id="8" dur="1" fill="hold">
+                                          <p:stCondLst>
+                                            <p:cond delay="0"/>
+                                          </p:stCondLst>
+                                        </p:cTn>
+                                        <p:tgtEl>
+                                          <p:spTgt spid="1026"/>
+                                        </p:tgtEl>
+                                        <p:attrNameLst>
+                                          <p:attrName>style.visibility</p:attrName>
+                                        </p:attrNameLst>
+                                      </p:cBhvr>
+                                      <p:to>
+                                        <p:strVal val="visible"/>
+                                      </p:to>
+                                    </p:set>
+                                  </p:childTnLst>
+                                </p:cTn>
+                              </p:par>
+                            </p:childTnLst>
+                          </p:cTn>
+                        </p:par>
+                      </p:childTnLst>
+                    </p:cTn>
+                  </p:par>
+                </p:childTnLst>
+              </p:cTn>
+              <p:prevCondLst>
+                <p:cond evt="onPrev" delay="0">
+                  <p:tgtEl>
+                    <p:sldTgt/>
+                  </p:tgtEl>
+                </p:cond>
+              </p:prevCondLst>
+              <p:nextCondLst>
+                <p:cond evt="onNext" delay="0">
+                  <p:tgtEl>
+                    <p:sldTgt/>
+                  </p:tgtEl>
+                </p:cond>
+              </p:nextCondLst>
+            </p:seq>
+          </p:childTnLst>
+        </p:cTn>
+      </p:par>
+    </p:tnLst>
+  </p:timing>
 </p:sld>
 </file>
 
 <file path=ppt/slides/slide34.xml><?xml version="1.0" encoding="utf-8"?>
+<p:sld xmlns:a="http://schemas.openxmlformats.org/drawingml/2006/main" xmlns:r="http://schemas.openxmlformats.org/officeDocument/2006/relationships" xmlns:p="http://schemas.openxmlformats.org/presentationml/2006/main">
+  <p:cSld>
+    <p:spTree>
+      <p:nvGrpSpPr>
+        <p:cNvPr id="1" name=""/>
+        <p:cNvGrpSpPr/>
+        <p:nvPr/>
+      </p:nvGrpSpPr>
+      <p:grpSpPr>
+        <a:xfrm>
+          <a:off x="0" y="0"/>
+          <a:ext cx="0" cy="0"/>
+          <a:chOff x="0" y="0"/>
+          <a:chExt cx="0" cy="0"/>
+        </a:xfrm>
+      </p:grpSpPr>
+      <p:sp>
+        <p:nvSpPr>
+          <p:cNvPr id="2" name="Slide Number Placeholder 1">
+            <a:extLst>
+              <a:ext uri="{FF2B5EF4-FFF2-40B4-BE49-F238E27FC236}">
+                <a16:creationId xmlns:a16="http://schemas.microsoft.com/office/drawing/2014/main" id="{A9C4A0FA-3D55-2576-A2AA-CC95570ED22A}"/>
+              </a:ext>
+            </a:extLst>
+          </p:cNvPr>
+          <p:cNvSpPr>
+            <a:spLocks noGrp="1"/>
+          </p:cNvSpPr>
+          <p:nvPr>
+            <p:ph type="sldNum" sz="quarter" idx="5"/>
+          </p:nvPr>
+        </p:nvSpPr>
+        <p:spPr/>
+        <p:txBody>
+          <a:bodyPr/>
+          <a:lstStyle/>
+          <a:p>
+            <a:fld id="{2BF067CD-8E6B-4360-9AA8-C5DF2A48A6D1}" type="slidenum">
+              <a:rPr lang="en-US" noProof="0" smtClean="0"/>
+              <a:pPr/>
+              <a:t>34</a:t>
+            </a:fld>
+            <a:endParaRPr lang="en-US" noProof="0" dirty="0"/>
+          </a:p>
+        </p:txBody>
+      </p:sp>
+      <p:sp>
+        <p:nvSpPr>
+          <p:cNvPr id="3" name="Text Placeholder 2">
+            <a:extLst>
+              <a:ext uri="{FF2B5EF4-FFF2-40B4-BE49-F238E27FC236}">
+                <a16:creationId xmlns:a16="http://schemas.microsoft.com/office/drawing/2014/main" id="{B83247CC-F1B1-0E19-BDA2-320452239588}"/>
+              </a:ext>
+            </a:extLst>
+          </p:cNvPr>
+          <p:cNvSpPr>
+            <a:spLocks noGrp="1"/>
+          </p:cNvSpPr>
+          <p:nvPr>
+            <p:ph type="body" sz="quarter" idx="10"/>
+          </p:nvPr>
+        </p:nvSpPr>
+        <p:spPr/>
+        <p:txBody>
+          <a:bodyPr/>
+          <a:lstStyle/>
+          <a:p>
+            <a:r>
+              <a:rPr lang="ru-RU" dirty="0"/>
+              <a:t>Изберете </a:t>
+            </a:r>
+            <a:r>
+              <a:rPr lang="ru-RU" b="1" dirty="0">
+                <a:solidFill>
+                  <a:schemeClr val="bg1"/>
+                </a:solidFill>
+              </a:rPr>
+              <a:t>таблиците</a:t>
+            </a:r>
+            <a:r>
+              <a:rPr lang="ru-RU" dirty="0"/>
+              <a:t>, които сте създали по-горе, и след това натиснете </a:t>
+            </a:r>
+            <a:r>
+              <a:rPr lang="en-US" b="1" dirty="0">
+                <a:solidFill>
+                  <a:schemeClr val="bg1"/>
+                </a:solidFill>
+                <a:latin typeface="Consolas" panose="020B0609020204030204" pitchFamily="49" charset="0"/>
+              </a:rPr>
+              <a:t>[Add]</a:t>
+            </a:r>
+            <a:endParaRPr lang="en-US" dirty="0"/>
+          </a:p>
+          <a:p>
+            <a:pPr marL="0" indent="0">
+              <a:buNone/>
+            </a:pPr>
+            <a:endParaRPr lang="en-US" dirty="0"/>
+          </a:p>
+        </p:txBody>
+      </p:sp>
+      <p:sp>
+        <p:nvSpPr>
+          <p:cNvPr id="4" name="Title 3">
+            <a:extLst>
+              <a:ext uri="{FF2B5EF4-FFF2-40B4-BE49-F238E27FC236}">
+                <a16:creationId xmlns:a16="http://schemas.microsoft.com/office/drawing/2014/main" id="{54589B38-BDB5-3D66-2BF7-A3D0F1588633}"/>
+              </a:ext>
+            </a:extLst>
+          </p:cNvPr>
+          <p:cNvSpPr>
+            <a:spLocks noGrp="1"/>
+          </p:cNvSpPr>
+          <p:nvPr>
+            <p:ph type="title"/>
+          </p:nvPr>
+        </p:nvSpPr>
+        <p:spPr/>
+        <p:txBody>
+          <a:bodyPr/>
+          <a:lstStyle/>
+          <a:p>
+            <a:r>
+              <a:rPr lang="bg-BG" dirty="0"/>
+              <a:t>Как да създадем </a:t>
+            </a:r>
+            <a:r>
+              <a:rPr lang="en-US" dirty="0"/>
+              <a:t>E/R </a:t>
+            </a:r>
+            <a:r>
+              <a:rPr lang="bg-BG" dirty="0"/>
+              <a:t>диаграма? (</a:t>
+            </a:r>
+            <a:r>
+              <a:rPr lang="en-US" dirty="0"/>
+              <a:t>2</a:t>
+            </a:r>
+            <a:r>
+              <a:rPr lang="bg-BG" dirty="0"/>
+              <a:t>)</a:t>
+            </a:r>
+            <a:endParaRPr lang="en-US" dirty="0"/>
+          </a:p>
+        </p:txBody>
+      </p:sp>
+      <p:pic>
+        <p:nvPicPr>
+          <p:cNvPr id="2052" name="Picture 4" descr="Add tables to ER diagram">
+            <a:extLst>
+              <a:ext uri="{FF2B5EF4-FFF2-40B4-BE49-F238E27FC236}">
+                <a16:creationId xmlns:a16="http://schemas.microsoft.com/office/drawing/2014/main" id="{D2460A47-7DE1-A87B-00B5-9A7FEAC0BDE8}"/>
+              </a:ext>
+            </a:extLst>
+          </p:cNvPr>
+          <p:cNvPicPr>
+            <a:picLocks noChangeAspect="1" noChangeArrowheads="1"/>
+          </p:cNvPicPr>
+          <p:nvPr/>
+        </p:nvPicPr>
+        <p:blipFill>
+          <a:blip r:embed="rId2">
+            <a:extLst>
+              <a:ext uri="{28A0092B-C50C-407E-A947-70E740481C1C}">
+                <a14:useLocalDpi xmlns:a14="http://schemas.microsoft.com/office/drawing/2010/main" val="0"/>
+              </a:ext>
+            </a:extLst>
+          </a:blip>
+          <a:srcRect/>
+          <a:stretch>
+            <a:fillRect/>
+          </a:stretch>
+        </p:blipFill>
+        <p:spPr bwMode="auto">
+          <a:xfrm>
+            <a:off x="2404762" y="2619000"/>
+            <a:ext cx="7382476" cy="3849845"/>
+          </a:xfrm>
+          <a:prstGeom prst="rect">
+            <a:avLst/>
+          </a:prstGeom>
+          <a:noFill/>
+          <a:ln>
+            <a:solidFill>
+              <a:schemeClr val="bg2">
+                <a:lumMod val="75000"/>
+              </a:schemeClr>
+            </a:solidFill>
+          </a:ln>
+          <a:extLst>
+            <a:ext uri="{909E8E84-426E-40DD-AFC4-6F175D3DCCD1}">
+              <a14:hiddenFill xmlns:a14="http://schemas.microsoft.com/office/drawing/2010/main">
+                <a:solidFill>
+                  <a:srgbClr val="FFFFFF"/>
+                </a:solidFill>
+              </a14:hiddenFill>
+            </a:ext>
+          </a:extLst>
+        </p:spPr>
+      </p:pic>
+    </p:spTree>
+    <p:extLst>
+      <p:ext uri="{BB962C8B-B14F-4D97-AF65-F5344CB8AC3E}">
+        <p14:creationId xmlns:p14="http://schemas.microsoft.com/office/powerpoint/2010/main" val="1830359951"/>
+      </p:ext>
+    </p:extLst>
+  </p:cSld>
+  <p:clrMapOvr>
+    <a:masterClrMapping/>
+  </p:clrMapOvr>
+  <mc:AlternateContent xmlns:mc="http://schemas.openxmlformats.org/markup-compatibility/2006" xmlns:p14="http://schemas.microsoft.com/office/powerpoint/2010/main">
+    <mc:Choice Requires="p14">
+      <p:transition spd="slow" p14:dur="2000" advClick="0" advTm="5000"/>
+    </mc:Choice>
+    <mc:Fallback xmlns="">
+      <p:transition spd="slow" advClick="0" advTm="5000"/>
+    </mc:Fallback>
+  </mc:AlternateContent>
+</p:sld>
+</file>
+
+<file path=ppt/slides/slide35.xml><?xml version="1.0" encoding="utf-8"?>
+<p:sld xmlns:a="http://schemas.openxmlformats.org/drawingml/2006/main" xmlns:r="http://schemas.openxmlformats.org/officeDocument/2006/relationships" xmlns:p="http://schemas.openxmlformats.org/presentationml/2006/main">
+  <p:cSld>
+    <p:spTree>
+      <p:nvGrpSpPr>
+        <p:cNvPr id="1" name=""/>
+        <p:cNvGrpSpPr/>
+        <p:nvPr/>
+      </p:nvGrpSpPr>
+      <p:grpSpPr>
+        <a:xfrm>
+          <a:off x="0" y="0"/>
+          <a:ext cx="0" cy="0"/>
+          <a:chOff x="0" y="0"/>
+          <a:chExt cx="0" cy="0"/>
+        </a:xfrm>
+      </p:grpSpPr>
+      <p:sp>
+        <p:nvSpPr>
+          <p:cNvPr id="2" name="Slide Number Placeholder 1">
+            <a:extLst>
+              <a:ext uri="{FF2B5EF4-FFF2-40B4-BE49-F238E27FC236}">
+                <a16:creationId xmlns:a16="http://schemas.microsoft.com/office/drawing/2014/main" id="{A9C4A0FA-3D55-2576-A2AA-CC95570ED22A}"/>
+              </a:ext>
+            </a:extLst>
+          </p:cNvPr>
+          <p:cNvSpPr>
+            <a:spLocks noGrp="1"/>
+          </p:cNvSpPr>
+          <p:nvPr>
+            <p:ph type="sldNum" sz="quarter" idx="5"/>
+          </p:nvPr>
+        </p:nvSpPr>
+        <p:spPr/>
+        <p:txBody>
+          <a:bodyPr/>
+          <a:lstStyle/>
+          <a:p>
+            <a:fld id="{2BF067CD-8E6B-4360-9AA8-C5DF2A48A6D1}" type="slidenum">
+              <a:rPr lang="en-US" noProof="0" smtClean="0"/>
+              <a:pPr/>
+              <a:t>35</a:t>
+            </a:fld>
+            <a:endParaRPr lang="en-US" noProof="0" dirty="0"/>
+          </a:p>
+        </p:txBody>
+      </p:sp>
+      <p:sp>
+        <p:nvSpPr>
+          <p:cNvPr id="3" name="Text Placeholder 2">
+            <a:extLst>
+              <a:ext uri="{FF2B5EF4-FFF2-40B4-BE49-F238E27FC236}">
+                <a16:creationId xmlns:a16="http://schemas.microsoft.com/office/drawing/2014/main" id="{B83247CC-F1B1-0E19-BDA2-320452239588}"/>
+              </a:ext>
+            </a:extLst>
+          </p:cNvPr>
+          <p:cNvSpPr>
+            <a:spLocks noGrp="1"/>
+          </p:cNvSpPr>
+          <p:nvPr>
+            <p:ph type="body" sz="quarter" idx="10"/>
+          </p:nvPr>
+        </p:nvSpPr>
+        <p:spPr/>
+        <p:txBody>
+          <a:bodyPr/>
+          <a:lstStyle/>
+          <a:p>
+            <a:r>
+              <a:rPr lang="bg-BG" dirty="0"/>
+              <a:t>Това генерира </a:t>
+            </a:r>
+            <a:r>
+              <a:rPr lang="en-US" b="1" dirty="0">
+                <a:solidFill>
+                  <a:schemeClr val="bg1"/>
+                </a:solidFill>
+              </a:rPr>
+              <a:t>E/R </a:t>
+            </a:r>
+            <a:r>
+              <a:rPr lang="bg-BG" b="1" dirty="0">
+                <a:solidFill>
+                  <a:schemeClr val="bg1"/>
+                </a:solidFill>
+              </a:rPr>
+              <a:t>диаграмата</a:t>
+            </a:r>
+            <a:endParaRPr lang="en-US" b="1" dirty="0">
+              <a:solidFill>
+                <a:schemeClr val="bg1"/>
+              </a:solidFill>
+            </a:endParaRPr>
+          </a:p>
+        </p:txBody>
+      </p:sp>
+      <p:sp>
+        <p:nvSpPr>
+          <p:cNvPr id="4" name="Title 3">
+            <a:extLst>
+              <a:ext uri="{FF2B5EF4-FFF2-40B4-BE49-F238E27FC236}">
+                <a16:creationId xmlns:a16="http://schemas.microsoft.com/office/drawing/2014/main" id="{54589B38-BDB5-3D66-2BF7-A3D0F1588633}"/>
+              </a:ext>
+            </a:extLst>
+          </p:cNvPr>
+          <p:cNvSpPr>
+            <a:spLocks noGrp="1"/>
+          </p:cNvSpPr>
+          <p:nvPr>
+            <p:ph type="title"/>
+          </p:nvPr>
+        </p:nvSpPr>
+        <p:spPr/>
+        <p:txBody>
+          <a:bodyPr/>
+          <a:lstStyle/>
+          <a:p>
+            <a:r>
+              <a:rPr lang="bg-BG" dirty="0"/>
+              <a:t>Как да създадем </a:t>
+            </a:r>
+            <a:r>
+              <a:rPr lang="en-US" dirty="0"/>
+              <a:t>E/R </a:t>
+            </a:r>
+            <a:r>
+              <a:rPr lang="bg-BG" dirty="0"/>
+              <a:t>диаграма? (3)</a:t>
+            </a:r>
+            <a:endParaRPr lang="en-US" dirty="0"/>
+          </a:p>
+        </p:txBody>
+      </p:sp>
+      <p:pic>
+        <p:nvPicPr>
+          <p:cNvPr id="3074" name="Picture 2" descr="ER Diagram">
+            <a:extLst>
+              <a:ext uri="{FF2B5EF4-FFF2-40B4-BE49-F238E27FC236}">
+                <a16:creationId xmlns:a16="http://schemas.microsoft.com/office/drawing/2014/main" id="{5F9418AD-809D-92F3-ABFA-46CB9EDAD66F}"/>
+              </a:ext>
+            </a:extLst>
+          </p:cNvPr>
+          <p:cNvPicPr>
+            <a:picLocks noChangeAspect="1" noChangeArrowheads="1"/>
+          </p:cNvPicPr>
+          <p:nvPr/>
+        </p:nvPicPr>
+        <p:blipFill>
+          <a:blip r:embed="rId2">
+            <a:extLst>
+              <a:ext uri="{28A0092B-C50C-407E-A947-70E740481C1C}">
+                <a14:useLocalDpi xmlns:a14="http://schemas.microsoft.com/office/drawing/2010/main" val="0"/>
+              </a:ext>
+            </a:extLst>
+          </a:blip>
+          <a:srcRect/>
+          <a:stretch>
+            <a:fillRect/>
+          </a:stretch>
+        </p:blipFill>
+        <p:spPr bwMode="auto">
+          <a:xfrm>
+            <a:off x="3399922" y="2016000"/>
+            <a:ext cx="5392156" cy="4563000"/>
+          </a:xfrm>
+          <a:prstGeom prst="rect">
+            <a:avLst/>
+          </a:prstGeom>
+          <a:noFill/>
+          <a:ln>
+            <a:solidFill>
+              <a:schemeClr val="bg2">
+                <a:lumMod val="75000"/>
+              </a:schemeClr>
+            </a:solidFill>
+          </a:ln>
+          <a:extLst>
+            <a:ext uri="{909E8E84-426E-40DD-AFC4-6F175D3DCCD1}">
+              <a14:hiddenFill xmlns:a14="http://schemas.microsoft.com/office/drawing/2010/main">
+                <a:solidFill>
+                  <a:srgbClr val="FFFFFF"/>
+                </a:solidFill>
+              </a14:hiddenFill>
+            </a:ext>
+          </a:extLst>
+        </p:spPr>
+      </p:pic>
+    </p:spTree>
+    <p:extLst>
+      <p:ext uri="{BB962C8B-B14F-4D97-AF65-F5344CB8AC3E}">
+        <p14:creationId xmlns:p14="http://schemas.microsoft.com/office/powerpoint/2010/main" val="2954975068"/>
+      </p:ext>
+    </p:extLst>
+  </p:cSld>
+  <p:clrMapOvr>
+    <a:masterClrMapping/>
+  </p:clrMapOvr>
+  <mc:AlternateContent xmlns:mc="http://schemas.openxmlformats.org/markup-compatibility/2006" xmlns:p14="http://schemas.microsoft.com/office/powerpoint/2010/main">
+    <mc:Choice Requires="p14">
+      <p:transition spd="slow" p14:dur="2000" advClick="0" advTm="5000"/>
+    </mc:Choice>
+    <mc:Fallback xmlns="">
+      <p:transition spd="slow" advClick="0" advTm="5000"/>
+    </mc:Fallback>
+  </mc:AlternateContent>
+</p:sld>
+</file>
+
+<file path=ppt/slides/slide36.xml><?xml version="1.0" encoding="utf-8"?>
 <p:sld xmlns:a="http://schemas.openxmlformats.org/drawingml/2006/main" xmlns:r="http://schemas.openxmlformats.org/officeDocument/2006/relationships" xmlns:p="http://schemas.openxmlformats.org/presentationml/2006/main">
   <p:cSld>
     <p:spTree>
@@ -30437,7 +31165,7 @@
             <a:fld id="{2BF067CD-8E6B-4360-9AA8-C5DF2A48A6D1}" type="slidenum">
               <a:rPr lang="en-US" noProof="0" smtClean="0"/>
               <a:pPr/>
-              <a:t>34</a:t>
+              <a:t>36</a:t>
             </a:fld>
             <a:endParaRPr lang="en-US" noProof="0" dirty="0"/>
           </a:p>
@@ -30868,7 +31596,7 @@
 </p:sld>
 </file>
 
-<file path=ppt/slides/slide35.xml><?xml version="1.0" encoding="utf-8"?>
+<file path=ppt/slides/slide37.xml><?xml version="1.0" encoding="utf-8"?>
 <p:sld xmlns:a="http://schemas.openxmlformats.org/drawingml/2006/main" xmlns:r="http://schemas.openxmlformats.org/officeDocument/2006/relationships" xmlns:p="http://schemas.openxmlformats.org/presentationml/2006/main">
   <p:cSld>
     <p:spTree>
@@ -31058,7 +31786,7 @@
 </p:sld>
 </file>
 
-<file path=ppt/slides/slide36.xml><?xml version="1.0" encoding="utf-8"?>
+<file path=ppt/slides/slide38.xml><?xml version="1.0" encoding="utf-8"?>
 <p:sld xmlns:a="http://schemas.openxmlformats.org/drawingml/2006/main" xmlns:r="http://schemas.openxmlformats.org/officeDocument/2006/relationships" xmlns:p="http://schemas.openxmlformats.org/presentationml/2006/main">
   <p:cSld>
     <p:spTree>
@@ -31414,7 +32142,7 @@
             <a:fld id="{2BF067CD-8E6B-4360-9AA8-C5DF2A48A6D1}" type="slidenum">
               <a:rPr lang="en-US" noProof="0" smtClean="0"/>
               <a:pPr/>
-              <a:t>36</a:t>
+              <a:t>38</a:t>
             </a:fld>
             <a:endParaRPr lang="en-US" noProof="0" dirty="0"/>
           </a:p>

</xml_diff>